<commit_message>
Atualização no relatorio do projeto
</commit_message>
<xml_diff>
--- a/Documentação/HLD -LLD (1).pptx
+++ b/Documentação/HLD -LLD (1).pptx
@@ -1186,7 +1186,7 @@
           <a:p>
             <a:fld id="{EB60841A-4D04-44D0-9551-1643E2F32A38}" type="datetimeFigureOut">
               <a:rPr lang="pt-BR" smtClean="0"/>
-              <a:t>21/10/2020</a:t>
+              <a:t>26/10/2020</a:t>
             </a:fld>
             <a:endParaRPr lang="pt-BR"/>
           </a:p>
@@ -1384,7 +1384,7 @@
           <a:p>
             <a:fld id="{EB60841A-4D04-44D0-9551-1643E2F32A38}" type="datetimeFigureOut">
               <a:rPr lang="pt-BR" smtClean="0"/>
-              <a:t>21/10/2020</a:t>
+              <a:t>26/10/2020</a:t>
             </a:fld>
             <a:endParaRPr lang="pt-BR"/>
           </a:p>
@@ -1592,7 +1592,7 @@
           <a:p>
             <a:fld id="{EB60841A-4D04-44D0-9551-1643E2F32A38}" type="datetimeFigureOut">
               <a:rPr lang="pt-BR" smtClean="0"/>
-              <a:t>21/10/2020</a:t>
+              <a:t>26/10/2020</a:t>
             </a:fld>
             <a:endParaRPr lang="pt-BR"/>
           </a:p>
@@ -1812,7 +1812,7 @@
           <a:p>
             <a:fld id="{F7EC64ED-7566-42AD-8F25-50CCDA65E5AC}" type="datetimeFigureOut">
               <a:rPr lang="pt-BR" smtClean="0"/>
-              <a:t>21/10/2020</a:t>
+              <a:t>26/10/2020</a:t>
             </a:fld>
             <a:endParaRPr lang="pt-BR"/>
           </a:p>
@@ -2010,7 +2010,7 @@
           <a:p>
             <a:fld id="{EB60841A-4D04-44D0-9551-1643E2F32A38}" type="datetimeFigureOut">
               <a:rPr lang="pt-BR" smtClean="0"/>
-              <a:t>21/10/2020</a:t>
+              <a:t>26/10/2020</a:t>
             </a:fld>
             <a:endParaRPr lang="pt-BR"/>
           </a:p>
@@ -2285,7 +2285,7 @@
           <a:p>
             <a:fld id="{EB60841A-4D04-44D0-9551-1643E2F32A38}" type="datetimeFigureOut">
               <a:rPr lang="pt-BR" smtClean="0"/>
-              <a:t>21/10/2020</a:t>
+              <a:t>26/10/2020</a:t>
             </a:fld>
             <a:endParaRPr lang="pt-BR"/>
           </a:p>
@@ -2550,7 +2550,7 @@
           <a:p>
             <a:fld id="{EB60841A-4D04-44D0-9551-1643E2F32A38}" type="datetimeFigureOut">
               <a:rPr lang="pt-BR" smtClean="0"/>
-              <a:t>21/10/2020</a:t>
+              <a:t>26/10/2020</a:t>
             </a:fld>
             <a:endParaRPr lang="pt-BR"/>
           </a:p>
@@ -2962,7 +2962,7 @@
           <a:p>
             <a:fld id="{EB60841A-4D04-44D0-9551-1643E2F32A38}" type="datetimeFigureOut">
               <a:rPr lang="pt-BR" smtClean="0"/>
-              <a:t>21/10/2020</a:t>
+              <a:t>26/10/2020</a:t>
             </a:fld>
             <a:endParaRPr lang="pt-BR"/>
           </a:p>
@@ -3103,7 +3103,7 @@
           <a:p>
             <a:fld id="{EB60841A-4D04-44D0-9551-1643E2F32A38}" type="datetimeFigureOut">
               <a:rPr lang="pt-BR" smtClean="0"/>
-              <a:t>21/10/2020</a:t>
+              <a:t>26/10/2020</a:t>
             </a:fld>
             <a:endParaRPr lang="pt-BR"/>
           </a:p>
@@ -3216,7 +3216,7 @@
           <a:p>
             <a:fld id="{EB60841A-4D04-44D0-9551-1643E2F32A38}" type="datetimeFigureOut">
               <a:rPr lang="pt-BR" smtClean="0"/>
-              <a:t>21/10/2020</a:t>
+              <a:t>26/10/2020</a:t>
             </a:fld>
             <a:endParaRPr lang="pt-BR"/>
           </a:p>
@@ -3527,7 +3527,7 @@
           <a:p>
             <a:fld id="{EB60841A-4D04-44D0-9551-1643E2F32A38}" type="datetimeFigureOut">
               <a:rPr lang="pt-BR" smtClean="0"/>
-              <a:t>21/10/2020</a:t>
+              <a:t>26/10/2020</a:t>
             </a:fld>
             <a:endParaRPr lang="pt-BR"/>
           </a:p>
@@ -3815,7 +3815,7 @@
           <a:p>
             <a:fld id="{EB60841A-4D04-44D0-9551-1643E2F32A38}" type="datetimeFigureOut">
               <a:rPr lang="pt-BR" smtClean="0"/>
-              <a:t>21/10/2020</a:t>
+              <a:t>26/10/2020</a:t>
             </a:fld>
             <a:endParaRPr lang="pt-BR"/>
           </a:p>
@@ -4056,7 +4056,7 @@
           <a:p>
             <a:fld id="{EB60841A-4D04-44D0-9551-1643E2F32A38}" type="datetimeFigureOut">
               <a:rPr lang="pt-BR" smtClean="0"/>
-              <a:t>21/10/2020</a:t>
+              <a:t>26/10/2020</a:t>
             </a:fld>
             <a:endParaRPr lang="pt-BR"/>
           </a:p>
@@ -4624,7 +4624,7 @@
           <a:p>
             <a:fld id="{F7EC64ED-7566-42AD-8F25-50CCDA65E5AC}" type="datetimeFigureOut">
               <a:rPr lang="pt-BR" smtClean="0"/>
-              <a:t>21/10/2020</a:t>
+              <a:t>26/10/2020</a:t>
             </a:fld>
             <a:endParaRPr lang="pt-BR"/>
           </a:p>
@@ -9234,21 +9234,6 @@
 </file>
 
 <file path=customXml/item1.xml><?xml version="1.0" encoding="utf-8"?>
-<?mso-contentType ?>
-<FormTemplates xmlns="http://schemas.microsoft.com/sharepoint/v3/contenttype/forms">
-  <Display>DocumentLibraryForm</Display>
-  <Edit>DocumentLibraryForm</Edit>
-  <New>DocumentLibraryForm</New>
-</FormTemplates>
-</file>
-
-<file path=customXml/item2.xml><?xml version="1.0" encoding="utf-8"?>
-<p:properties xmlns:p="http://schemas.microsoft.com/office/2006/metadata/properties" xmlns:xsi="http://www.w3.org/2001/XMLSchema-instance" xmlns:pc="http://schemas.microsoft.com/office/infopath/2007/PartnerControls">
-  <documentManagement/>
-</p:properties>
-</file>
-
-<file path=customXml/item3.xml><?xml version="1.0" encoding="utf-8"?>
 <ct:contentTypeSchema xmlns:ct="http://schemas.microsoft.com/office/2006/metadata/contentType" xmlns:ma="http://schemas.microsoft.com/office/2006/metadata/properties/metaAttributes" ct:_="" ma:_="" ma:contentTypeName="Document" ma:contentTypeID="0x0101009A5FC0246A07B443A05063C8EB2AC7D8" ma:contentTypeVersion="4" ma:contentTypeDescription="Create a new document." ma:contentTypeScope="" ma:versionID="420c53bd1eddcc29702e3bd566eef293">
   <xsd:schema xmlns:xsd="http://www.w3.org/2001/XMLSchema" xmlns:xs="http://www.w3.org/2001/XMLSchema" xmlns:p="http://schemas.microsoft.com/office/2006/metadata/properties" xmlns:ns3="8061e086-846d-4709-83ef-f95cce98977c" targetNamespace="http://schemas.microsoft.com/office/2006/metadata/properties" ma:root="true" ma:fieldsID="c54485a539c6ae15085b338092698602" ns3:_="">
     <xsd:import namespace="8061e086-846d-4709-83ef-f95cce98977c"/>
@@ -9394,10 +9379,35 @@
 </ct:contentTypeSchema>
 </file>
 
+<file path=customXml/item2.xml><?xml version="1.0" encoding="utf-8"?>
+<p:properties xmlns:p="http://schemas.microsoft.com/office/2006/metadata/properties" xmlns:xsi="http://www.w3.org/2001/XMLSchema-instance" xmlns:pc="http://schemas.microsoft.com/office/infopath/2007/PartnerControls">
+  <documentManagement/>
+</p:properties>
+</file>
+
+<file path=customXml/item3.xml><?xml version="1.0" encoding="utf-8"?>
+<?mso-contentType ?>
+<FormTemplates xmlns="http://schemas.microsoft.com/sharepoint/v3/contenttype/forms">
+  <Display>DocumentLibraryForm</Display>
+  <Edit>DocumentLibraryForm</Edit>
+  <New>DocumentLibraryForm</New>
+</FormTemplates>
+</file>
+
 <file path=customXml/itemProps1.xml><?xml version="1.0" encoding="utf-8"?>
-<ds:datastoreItem xmlns:ds="http://schemas.openxmlformats.org/officeDocument/2006/customXml" ds:itemID="{C8904B04-CE3B-480B-B581-8F4B320FC628}">
+<ds:datastoreItem xmlns:ds="http://schemas.openxmlformats.org/officeDocument/2006/customXml" ds:itemID="{4391E346-D1DC-4EE5-A343-4BFCAD5F0129}">
   <ds:schemaRefs>
-    <ds:schemaRef ds:uri="http://schemas.microsoft.com/sharepoint/v3/contenttype/forms"/>
+    <ds:schemaRef ds:uri="http://schemas.microsoft.com/office/2006/metadata/contentType"/>
+    <ds:schemaRef ds:uri="http://schemas.microsoft.com/office/2006/metadata/properties/metaAttributes"/>
+    <ds:schemaRef ds:uri="http://www.w3.org/2001/XMLSchema"/>
+    <ds:schemaRef ds:uri="http://schemas.microsoft.com/office/2006/metadata/properties"/>
+    <ds:schemaRef ds:uri="8061e086-846d-4709-83ef-f95cce98977c"/>
+    <ds:schemaRef ds:uri="http://schemas.microsoft.com/office/2006/documentManagement/types"/>
+    <ds:schemaRef ds:uri="http://schemas.microsoft.com/office/infopath/2007/PartnerControls"/>
+    <ds:schemaRef ds:uri="http://schemas.openxmlformats.org/package/2006/metadata/core-properties"/>
+    <ds:schemaRef ds:uri="http://purl.org/dc/elements/1.1/"/>
+    <ds:schemaRef ds:uri="http://purl.org/dc/terms/"/>
+    <ds:schemaRef ds:uri="http://schemas.microsoft.com/internal/obd"/>
   </ds:schemaRefs>
 </ds:datastoreItem>
 </file>
@@ -9419,19 +9429,9 @@
 </file>
 
 <file path=customXml/itemProps3.xml><?xml version="1.0" encoding="utf-8"?>
-<ds:datastoreItem xmlns:ds="http://schemas.openxmlformats.org/officeDocument/2006/customXml" ds:itemID="{4391E346-D1DC-4EE5-A343-4BFCAD5F0129}">
+<ds:datastoreItem xmlns:ds="http://schemas.openxmlformats.org/officeDocument/2006/customXml" ds:itemID="{C8904B04-CE3B-480B-B581-8F4B320FC628}">
   <ds:schemaRefs>
-    <ds:schemaRef ds:uri="http://schemas.microsoft.com/office/2006/metadata/contentType"/>
-    <ds:schemaRef ds:uri="http://schemas.microsoft.com/office/2006/metadata/properties/metaAttributes"/>
-    <ds:schemaRef ds:uri="http://www.w3.org/2001/XMLSchema"/>
-    <ds:schemaRef ds:uri="http://schemas.microsoft.com/office/2006/metadata/properties"/>
-    <ds:schemaRef ds:uri="8061e086-846d-4709-83ef-f95cce98977c"/>
-    <ds:schemaRef ds:uri="http://schemas.microsoft.com/office/2006/documentManagement/types"/>
-    <ds:schemaRef ds:uri="http://schemas.microsoft.com/office/infopath/2007/PartnerControls"/>
-    <ds:schemaRef ds:uri="http://schemas.openxmlformats.org/package/2006/metadata/core-properties"/>
-    <ds:schemaRef ds:uri="http://purl.org/dc/elements/1.1/"/>
-    <ds:schemaRef ds:uri="http://purl.org/dc/terms/"/>
-    <ds:schemaRef ds:uri="http://schemas.microsoft.com/internal/obd"/>
+    <ds:schemaRef ds:uri="http://schemas.microsoft.com/sharepoint/v3/contenttype/forms"/>
   </ds:schemaRefs>
 </ds:datastoreItem>
 </file>
</xml_diff>